<commit_message>
Update 2020-08-20 INS Bootcamp HMM.pptx
</commit_message>
<xml_diff>
--- a/2020-08-20 INS Bootcamp HMM.pptx
+++ b/2020-08-20 INS Bootcamp HMM.pptx
@@ -7,21 +7,22 @@
     <p:sldMasterId id="2147483669" r:id="rId3"/>
   </p:sldMasterIdLst>
   <p:notesMasterIdLst>
-    <p:notesMasterId r:id="rId16"/>
+    <p:notesMasterId r:id="rId17"/>
   </p:notesMasterIdLst>
   <p:sldIdLst>
     <p:sldId id="715" r:id="rId4"/>
-    <p:sldId id="726" r:id="rId5"/>
-    <p:sldId id="732" r:id="rId6"/>
-    <p:sldId id="787" r:id="rId7"/>
-    <p:sldId id="789" r:id="rId8"/>
-    <p:sldId id="790" r:id="rId9"/>
-    <p:sldId id="791" r:id="rId10"/>
-    <p:sldId id="788" r:id="rId11"/>
-    <p:sldId id="793" r:id="rId12"/>
-    <p:sldId id="795" r:id="rId13"/>
-    <p:sldId id="796" r:id="rId14"/>
-    <p:sldId id="794" r:id="rId15"/>
+    <p:sldId id="797" r:id="rId5"/>
+    <p:sldId id="726" r:id="rId6"/>
+    <p:sldId id="732" r:id="rId7"/>
+    <p:sldId id="787" r:id="rId8"/>
+    <p:sldId id="789" r:id="rId9"/>
+    <p:sldId id="790" r:id="rId10"/>
+    <p:sldId id="791" r:id="rId11"/>
+    <p:sldId id="788" r:id="rId12"/>
+    <p:sldId id="793" r:id="rId13"/>
+    <p:sldId id="795" r:id="rId14"/>
+    <p:sldId id="796" r:id="rId15"/>
+    <p:sldId id="794" r:id="rId16"/>
   </p:sldIdLst>
   <p:sldSz cx="9144000" cy="5143500" type="screen16x9"/>
   <p:notesSz cx="6858000" cy="9313863"/>
@@ -156,6 +157,7 @@
         <p14:section name="Untitled Section" id="{3540F3E4-3A56-594D-A98C-62123F4F527F}">
           <p14:sldIdLst>
             <p14:sldId id="715"/>
+            <p14:sldId id="797"/>
             <p14:sldId id="726"/>
             <p14:sldId id="732"/>
             <p14:sldId id="787"/>
@@ -311,7 +313,7 @@
               <a:pPr>
                 <a:defRPr/>
               </a:pPr>
-              <a:t>8/19/20</a:t>
+              <a:t>8/20/20</a:t>
             </a:fld>
             <a:endParaRPr lang="en-US"/>
           </a:p>
@@ -743,6 +745,125 @@
 </p:notes>
 </file>
 
+<file path=ppt/notesSlides/notesSlide10.xml><?xml version="1.0" encoding="utf-8"?>
+<p:notes xmlns:a="http://schemas.openxmlformats.org/drawingml/2006/main" xmlns:r="http://schemas.openxmlformats.org/officeDocument/2006/relationships" xmlns:p="http://schemas.openxmlformats.org/presentationml/2006/main">
+  <p:cSld>
+    <p:spTree>
+      <p:nvGrpSpPr>
+        <p:cNvPr id="1" name=""/>
+        <p:cNvGrpSpPr/>
+        <p:nvPr/>
+      </p:nvGrpSpPr>
+      <p:grpSpPr>
+        <a:xfrm>
+          <a:off x="0" y="0"/>
+          <a:ext cx="0" cy="0"/>
+          <a:chOff x="0" y="0"/>
+          <a:chExt cx="0" cy="0"/>
+        </a:xfrm>
+      </p:grpSpPr>
+      <p:sp>
+        <p:nvSpPr>
+          <p:cNvPr id="2" name="Slide Image Placeholder 1"/>
+          <p:cNvSpPr>
+            <a:spLocks noGrp="1" noRot="1" noChangeAspect="1"/>
+          </p:cNvSpPr>
+          <p:nvPr>
+            <p:ph type="sldImg"/>
+          </p:nvPr>
+        </p:nvSpPr>
+        <p:spPr/>
+      </p:sp>
+      <p:sp>
+        <p:nvSpPr>
+          <p:cNvPr id="3" name="Notes Placeholder 2"/>
+          <p:cNvSpPr>
+            <a:spLocks noGrp="1"/>
+          </p:cNvSpPr>
+          <p:nvPr>
+            <p:ph type="body" idx="1"/>
+          </p:nvPr>
+        </p:nvSpPr>
+        <p:spPr/>
+        <p:txBody>
+          <a:bodyPr/>
+          <a:lstStyle/>
+          <a:p>
+            <a:pPr marL="0" marR="0" lvl="0" indent="0" algn="l" defTabSz="914400" rtl="0" eaLnBrk="0" fontAlgn="base" latinLnBrk="0" hangingPunct="0">
+              <a:lnSpc>
+                <a:spcPct val="100000"/>
+              </a:lnSpc>
+              <a:spcBef>
+                <a:spcPct val="30000"/>
+              </a:spcBef>
+              <a:spcAft>
+                <a:spcPct val="0"/>
+              </a:spcAft>
+              <a:buClrTx/>
+              <a:buSzTx/>
+              <a:buFontTx/>
+              <a:buNone/>
+              <a:tabLst/>
+              <a:defRPr/>
+            </a:pPr>
+            <a:r>
+              <a:rPr lang="en-US" sz="1200" kern="1200" dirty="0">
+                <a:solidFill>
+                  <a:schemeClr val="tx1"/>
+                </a:solidFill>
+                <a:effectLst/>
+                <a:latin typeface="Calibri" pitchFamily="34" charset="0"/>
+                <a:ea typeface="+mn-ea"/>
+                <a:cs typeface="+mn-cs"/>
+              </a:rPr>
+              <a:t>Their dysfunction is related to disorders such as epilepsy, autism spectrum disorder, intellectual disability, schizophrenia, and neurodevelopmental disorders such as fragile X syndrome. Altered GABAAR expression is also a common feature of Alzheimer’s, Parkinson’s and Huntington’s disease.</a:t>
+            </a:r>
+            <a:endParaRPr lang="en-US" dirty="0"/>
+          </a:p>
+        </p:txBody>
+      </p:sp>
+      <p:sp>
+        <p:nvSpPr>
+          <p:cNvPr id="4" name="Slide Number Placeholder 3"/>
+          <p:cNvSpPr>
+            <a:spLocks noGrp="1"/>
+          </p:cNvSpPr>
+          <p:nvPr>
+            <p:ph type="sldNum" sz="quarter" idx="5"/>
+          </p:nvPr>
+        </p:nvSpPr>
+        <p:spPr/>
+        <p:txBody>
+          <a:bodyPr/>
+          <a:lstStyle/>
+          <a:p>
+            <a:pPr>
+              <a:defRPr/>
+            </a:pPr>
+            <a:fld id="{6E074355-CE0D-4C68-A6CB-C364ED71B33B}" type="slidenum">
+              <a:rPr lang="en-US" smtClean="0"/>
+              <a:pPr>
+                <a:defRPr/>
+              </a:pPr>
+              <a:t>11</a:t>
+            </a:fld>
+            <a:endParaRPr lang="en-US"/>
+          </a:p>
+        </p:txBody>
+      </p:sp>
+    </p:spTree>
+    <p:extLst>
+      <p:ext uri="{BB962C8B-B14F-4D97-AF65-F5344CB8AC3E}">
+        <p14:creationId xmlns:p14="http://schemas.microsoft.com/office/powerpoint/2010/main" val="3622730483"/>
+      </p:ext>
+    </p:extLst>
+  </p:cSld>
+  <p:clrMapOvr>
+    <a:masterClrMapping/>
+  </p:clrMapOvr>
+</p:notes>
+</file>
+
 <file path=ppt/notesSlides/notesSlide2.xml><?xml version="1.0" encoding="utf-8"?>
 <p:notes xmlns:a="http://schemas.openxmlformats.org/drawingml/2006/main" xmlns:r="http://schemas.openxmlformats.org/officeDocument/2006/relationships" xmlns:p="http://schemas.openxmlformats.org/presentationml/2006/main">
   <p:cSld>
@@ -787,35 +908,6 @@
           <a:bodyPr/>
           <a:lstStyle/>
           <a:p>
-            <a:pPr marL="0" marR="0" lvl="0" indent="0" algn="l" defTabSz="914400" rtl="0" eaLnBrk="0" fontAlgn="base" latinLnBrk="0" hangingPunct="0">
-              <a:lnSpc>
-                <a:spcPct val="100000"/>
-              </a:lnSpc>
-              <a:spcBef>
-                <a:spcPct val="30000"/>
-              </a:spcBef>
-              <a:spcAft>
-                <a:spcPct val="0"/>
-              </a:spcAft>
-              <a:buClrTx/>
-              <a:buSzTx/>
-              <a:buFontTx/>
-              <a:buNone/>
-              <a:tabLst/>
-              <a:defRPr/>
-            </a:pPr>
-            <a:r>
-              <a:rPr lang="en-US" sz="1200" kern="1200" dirty="0">
-                <a:solidFill>
-                  <a:schemeClr val="tx1"/>
-                </a:solidFill>
-                <a:effectLst/>
-                <a:latin typeface="Calibri" pitchFamily="34" charset="0"/>
-                <a:ea typeface="+mn-ea"/>
-                <a:cs typeface="+mn-cs"/>
-              </a:rPr>
-              <a:t>Their dysfunction is related to disorders such as epilepsy, autism spectrum disorder, intellectual disability, schizophrenia, and neurodevelopmental disorders such as fragile X syndrome. Altered GABAAR expression is also a common feature of Alzheimer’s, Parkinson’s and Huntington’s disease.</a:t>
-            </a:r>
             <a:endParaRPr lang="en-US" dirty="0"/>
           </a:p>
         </p:txBody>
@@ -843,7 +935,7 @@
               <a:pPr>
                 <a:defRPr/>
               </a:pPr>
-              <a:t>3</a:t>
+              <a:t>2</a:t>
             </a:fld>
             <a:endParaRPr lang="en-US"/>
           </a:p>
@@ -852,7 +944,7 @@
     </p:spTree>
     <p:extLst>
       <p:ext uri="{BB962C8B-B14F-4D97-AF65-F5344CB8AC3E}">
-        <p14:creationId xmlns:p14="http://schemas.microsoft.com/office/powerpoint/2010/main" val="3902537767"/>
+        <p14:creationId xmlns:p14="http://schemas.microsoft.com/office/powerpoint/2010/main" val="3271486391"/>
       </p:ext>
     </p:extLst>
   </p:cSld>
@@ -971,7 +1063,7 @@
     </p:spTree>
     <p:extLst>
       <p:ext uri="{BB962C8B-B14F-4D97-AF65-F5344CB8AC3E}">
-        <p14:creationId xmlns:p14="http://schemas.microsoft.com/office/powerpoint/2010/main" val="1132759106"/>
+        <p14:creationId xmlns:p14="http://schemas.microsoft.com/office/powerpoint/2010/main" val="3902537767"/>
       </p:ext>
     </p:extLst>
   </p:cSld>
@@ -1090,7 +1182,7 @@
     </p:spTree>
     <p:extLst>
       <p:ext uri="{BB962C8B-B14F-4D97-AF65-F5344CB8AC3E}">
-        <p14:creationId xmlns:p14="http://schemas.microsoft.com/office/powerpoint/2010/main" val="59122640"/>
+        <p14:creationId xmlns:p14="http://schemas.microsoft.com/office/powerpoint/2010/main" val="1132759106"/>
       </p:ext>
     </p:extLst>
   </p:cSld>
@@ -1209,7 +1301,7 @@
     </p:spTree>
     <p:extLst>
       <p:ext uri="{BB962C8B-B14F-4D97-AF65-F5344CB8AC3E}">
-        <p14:creationId xmlns:p14="http://schemas.microsoft.com/office/powerpoint/2010/main" val="3009662959"/>
+        <p14:creationId xmlns:p14="http://schemas.microsoft.com/office/powerpoint/2010/main" val="59122640"/>
       </p:ext>
     </p:extLst>
   </p:cSld>
@@ -1328,7 +1420,7 @@
     </p:spTree>
     <p:extLst>
       <p:ext uri="{BB962C8B-B14F-4D97-AF65-F5344CB8AC3E}">
-        <p14:creationId xmlns:p14="http://schemas.microsoft.com/office/powerpoint/2010/main" val="454078148"/>
+        <p14:creationId xmlns:p14="http://schemas.microsoft.com/office/powerpoint/2010/main" val="3009662959"/>
       </p:ext>
     </p:extLst>
   </p:cSld>
@@ -1447,7 +1539,7 @@
     </p:spTree>
     <p:extLst>
       <p:ext uri="{BB962C8B-B14F-4D97-AF65-F5344CB8AC3E}">
-        <p14:creationId xmlns:p14="http://schemas.microsoft.com/office/powerpoint/2010/main" val="3714491458"/>
+        <p14:creationId xmlns:p14="http://schemas.microsoft.com/office/powerpoint/2010/main" val="454078148"/>
       </p:ext>
     </p:extLst>
   </p:cSld>
@@ -1566,7 +1658,7 @@
     </p:spTree>
     <p:extLst>
       <p:ext uri="{BB962C8B-B14F-4D97-AF65-F5344CB8AC3E}">
-        <p14:creationId xmlns:p14="http://schemas.microsoft.com/office/powerpoint/2010/main" val="908977629"/>
+        <p14:creationId xmlns:p14="http://schemas.microsoft.com/office/powerpoint/2010/main" val="3714491458"/>
       </p:ext>
     </p:extLst>
   </p:cSld>
@@ -1685,7 +1777,7 @@
     </p:spTree>
     <p:extLst>
       <p:ext uri="{BB962C8B-B14F-4D97-AF65-F5344CB8AC3E}">
-        <p14:creationId xmlns:p14="http://schemas.microsoft.com/office/powerpoint/2010/main" val="3622730483"/>
+        <p14:creationId xmlns:p14="http://schemas.microsoft.com/office/powerpoint/2010/main" val="908977629"/>
       </p:ext>
     </p:extLst>
   </p:cSld>
@@ -6387,6 +6479,509 @@
       </p:grpSpPr>
       <p:sp>
         <p:nvSpPr>
+          <p:cNvPr id="4" name="TextBox 3">
+            <a:extLst>
+              <a:ext uri="{FF2B5EF4-FFF2-40B4-BE49-F238E27FC236}">
+                <a16:creationId xmlns:a16="http://schemas.microsoft.com/office/drawing/2014/main" id="{683665B9-C7E1-F545-AEFF-6DB85B18262D}"/>
+              </a:ext>
+            </a:extLst>
+          </p:cNvPr>
+          <p:cNvSpPr txBox="1"/>
+          <p:nvPr/>
+        </p:nvSpPr>
+        <p:spPr>
+          <a:xfrm>
+            <a:off x="542608" y="2431792"/>
+            <a:ext cx="6452407" cy="461665"/>
+          </a:xfrm>
+          <a:prstGeom prst="rect">
+            <a:avLst/>
+          </a:prstGeom>
+          <a:noFill/>
+        </p:spPr>
+        <p:txBody>
+          <a:bodyPr wrap="none" rtlCol="0">
+            <a:spAutoFit/>
+          </a:bodyPr>
+          <a:lstStyle/>
+          <a:p>
+            <a:r>
+              <a:rPr lang="en-US" dirty="0">
+                <a:latin typeface="Courier" pitchFamily="2" charset="0"/>
+              </a:rPr>
+              <a:t>COOCODDDCO</a:t>
+            </a:r>
+            <a:r>
+              <a:rPr lang="en-US" dirty="0">
+                <a:solidFill>
+                  <a:srgbClr val="FF0000"/>
+                </a:solidFill>
+                <a:latin typeface="Courier" pitchFamily="2" charset="0"/>
+              </a:rPr>
+              <a:t>O</a:t>
+            </a:r>
+            <a:r>
+              <a:rPr lang="en-US" dirty="0">
+                <a:latin typeface="Courier" pitchFamily="2" charset="0"/>
+              </a:rPr>
+              <a:t>CCDDDDDDCCODDDCOOOCODD…</a:t>
+            </a:r>
+          </a:p>
+        </p:txBody>
+      </p:sp>
+      <p:sp>
+        <p:nvSpPr>
+          <p:cNvPr id="17" name="TextBox 16">
+            <a:extLst>
+              <a:ext uri="{FF2B5EF4-FFF2-40B4-BE49-F238E27FC236}">
+                <a16:creationId xmlns:a16="http://schemas.microsoft.com/office/drawing/2014/main" id="{8FDA5595-1CFA-C34B-AB35-5CD582475B29}"/>
+              </a:ext>
+            </a:extLst>
+          </p:cNvPr>
+          <p:cNvSpPr txBox="1"/>
+          <p:nvPr/>
+        </p:nvSpPr>
+        <p:spPr>
+          <a:xfrm>
+            <a:off x="542608" y="4239910"/>
+            <a:ext cx="6452407" cy="461665"/>
+          </a:xfrm>
+          <a:prstGeom prst="rect">
+            <a:avLst/>
+          </a:prstGeom>
+          <a:noFill/>
+        </p:spPr>
+        <p:txBody>
+          <a:bodyPr wrap="none" rtlCol="0">
+            <a:spAutoFit/>
+          </a:bodyPr>
+          <a:lstStyle/>
+          <a:p>
+            <a:r>
+              <a:rPr lang="en-US" dirty="0">
+                <a:latin typeface="Courier" pitchFamily="2" charset="0"/>
+              </a:rPr>
+              <a:t>0541610015</a:t>
+            </a:r>
+            <a:r>
+              <a:rPr lang="en-US" dirty="0">
+                <a:solidFill>
+                  <a:srgbClr val="FF0000"/>
+                </a:solidFill>
+                <a:latin typeface="Courier" pitchFamily="2" charset="0"/>
+              </a:rPr>
+              <a:t>6</a:t>
+            </a:r>
+            <a:r>
+              <a:rPr lang="en-US" dirty="0">
+                <a:latin typeface="Courier" pitchFamily="2" charset="0"/>
+              </a:rPr>
+              <a:t>0001100100301014450610…</a:t>
+            </a:r>
+          </a:p>
+        </p:txBody>
+      </p:sp>
+      <p:sp>
+        <p:nvSpPr>
+          <p:cNvPr id="5" name="TextBox 4">
+            <a:extLst>
+              <a:ext uri="{FF2B5EF4-FFF2-40B4-BE49-F238E27FC236}">
+                <a16:creationId xmlns:a16="http://schemas.microsoft.com/office/drawing/2014/main" id="{B741060C-5DED-1D4E-A8CE-BA86143A3FE6}"/>
+              </a:ext>
+            </a:extLst>
+          </p:cNvPr>
+          <p:cNvSpPr txBox="1"/>
+          <p:nvPr/>
+        </p:nvSpPr>
+        <p:spPr>
+          <a:xfrm>
+            <a:off x="2769179" y="3848700"/>
+            <a:ext cx="1999265" cy="461665"/>
+          </a:xfrm>
+          <a:prstGeom prst="rect">
+            <a:avLst/>
+          </a:prstGeom>
+          <a:noFill/>
+        </p:spPr>
+        <p:txBody>
+          <a:bodyPr wrap="none" rtlCol="0">
+            <a:spAutoFit/>
+          </a:bodyPr>
+          <a:lstStyle/>
+          <a:p>
+            <a:r>
+              <a:rPr lang="en-US" dirty="0">
+                <a:solidFill>
+                  <a:schemeClr val="accent1"/>
+                </a:solidFill>
+              </a:rPr>
+              <a:t>Observations</a:t>
+            </a:r>
+          </a:p>
+        </p:txBody>
+      </p:sp>
+      <p:sp>
+        <p:nvSpPr>
+          <p:cNvPr id="24" name="TextBox 23">
+            <a:extLst>
+              <a:ext uri="{FF2B5EF4-FFF2-40B4-BE49-F238E27FC236}">
+                <a16:creationId xmlns:a16="http://schemas.microsoft.com/office/drawing/2014/main" id="{D48F3805-6A82-964C-B7FA-47BA54A27E9C}"/>
+              </a:ext>
+            </a:extLst>
+          </p:cNvPr>
+          <p:cNvSpPr txBox="1"/>
+          <p:nvPr/>
+        </p:nvSpPr>
+        <p:spPr>
+          <a:xfrm>
+            <a:off x="2709066" y="2039763"/>
+            <a:ext cx="2119491" cy="461665"/>
+          </a:xfrm>
+          <a:prstGeom prst="rect">
+            <a:avLst/>
+          </a:prstGeom>
+          <a:noFill/>
+        </p:spPr>
+        <p:txBody>
+          <a:bodyPr wrap="none" rtlCol="0">
+            <a:spAutoFit/>
+          </a:bodyPr>
+          <a:lstStyle/>
+          <a:p>
+            <a:r>
+              <a:rPr lang="en-US" dirty="0">
+                <a:solidFill>
+                  <a:schemeClr val="accent1"/>
+                </a:solidFill>
+              </a:rPr>
+              <a:t>Hidden States</a:t>
+            </a:r>
+          </a:p>
+        </p:txBody>
+      </p:sp>
+      <p:sp>
+        <p:nvSpPr>
+          <p:cNvPr id="30" name="TextBox 29">
+            <a:extLst>
+              <a:ext uri="{FF2B5EF4-FFF2-40B4-BE49-F238E27FC236}">
+                <a16:creationId xmlns:a16="http://schemas.microsoft.com/office/drawing/2014/main" id="{1E908FEB-FC72-3E4A-B13F-E7DFB17E81C2}"/>
+              </a:ext>
+            </a:extLst>
+          </p:cNvPr>
+          <p:cNvSpPr txBox="1"/>
+          <p:nvPr/>
+        </p:nvSpPr>
+        <p:spPr>
+          <a:xfrm>
+            <a:off x="3308589" y="607925"/>
+            <a:ext cx="920445" cy="461665"/>
+          </a:xfrm>
+          <a:prstGeom prst="rect">
+            <a:avLst/>
+          </a:prstGeom>
+          <a:noFill/>
+        </p:spPr>
+        <p:txBody>
+          <a:bodyPr wrap="none" rtlCol="0">
+            <a:spAutoFit/>
+          </a:bodyPr>
+          <a:lstStyle/>
+          <a:p>
+            <a:r>
+              <a:rPr lang="en-US" dirty="0">
+                <a:solidFill>
+                  <a:schemeClr val="accent1"/>
+                </a:solidFill>
+              </a:rPr>
+              <a:t>HMM</a:t>
+            </a:r>
+          </a:p>
+        </p:txBody>
+      </p:sp>
+      <p:sp>
+        <p:nvSpPr>
+          <p:cNvPr id="31" name="Up-Down Arrow 30">
+            <a:extLst>
+              <a:ext uri="{FF2B5EF4-FFF2-40B4-BE49-F238E27FC236}">
+                <a16:creationId xmlns:a16="http://schemas.microsoft.com/office/drawing/2014/main" id="{4FE57355-1CA8-1743-B349-BC659B253737}"/>
+              </a:ext>
+            </a:extLst>
+          </p:cNvPr>
+          <p:cNvSpPr/>
+          <p:nvPr/>
+        </p:nvSpPr>
+        <p:spPr>
+          <a:xfrm>
+            <a:off x="3581400" y="1097476"/>
+            <a:ext cx="381000" cy="914400"/>
+          </a:xfrm>
+          <a:prstGeom prst="upDownArrow">
+            <a:avLst/>
+          </a:prstGeom>
+        </p:spPr>
+        <p:style>
+          <a:lnRef idx="1">
+            <a:schemeClr val="accent1"/>
+          </a:lnRef>
+          <a:fillRef idx="3">
+            <a:schemeClr val="accent1"/>
+          </a:fillRef>
+          <a:effectRef idx="2">
+            <a:schemeClr val="accent1"/>
+          </a:effectRef>
+          <a:fontRef idx="minor">
+            <a:schemeClr val="lt1"/>
+          </a:fontRef>
+        </p:style>
+        <p:txBody>
+          <a:bodyPr rtlCol="0" anchor="ctr"/>
+          <a:lstStyle/>
+          <a:p>
+            <a:pPr algn="ctr"/>
+            <a:endParaRPr lang="en-US"/>
+          </a:p>
+        </p:txBody>
+      </p:sp>
+      <p:sp>
+        <p:nvSpPr>
+          <p:cNvPr id="32" name="Up-Down Arrow 31">
+            <a:extLst>
+              <a:ext uri="{FF2B5EF4-FFF2-40B4-BE49-F238E27FC236}">
+                <a16:creationId xmlns:a16="http://schemas.microsoft.com/office/drawing/2014/main" id="{B4817856-AEA2-B24A-ADF3-5D6C1E7D04B5}"/>
+              </a:ext>
+            </a:extLst>
+          </p:cNvPr>
+          <p:cNvSpPr/>
+          <p:nvPr/>
+        </p:nvSpPr>
+        <p:spPr>
+          <a:xfrm>
+            <a:off x="3578311" y="2913878"/>
+            <a:ext cx="381000" cy="914400"/>
+          </a:xfrm>
+          <a:prstGeom prst="upDownArrow">
+            <a:avLst/>
+          </a:prstGeom>
+        </p:spPr>
+        <p:style>
+          <a:lnRef idx="1">
+            <a:schemeClr val="accent1"/>
+          </a:lnRef>
+          <a:fillRef idx="3">
+            <a:schemeClr val="accent1"/>
+          </a:fillRef>
+          <a:effectRef idx="2">
+            <a:schemeClr val="accent1"/>
+          </a:effectRef>
+          <a:fontRef idx="minor">
+            <a:schemeClr val="lt1"/>
+          </a:fontRef>
+        </p:style>
+        <p:txBody>
+          <a:bodyPr rtlCol="0" anchor="ctr"/>
+          <a:lstStyle/>
+          <a:p>
+            <a:pPr algn="ctr"/>
+            <a:endParaRPr lang="en-US"/>
+          </a:p>
+        </p:txBody>
+      </p:sp>
+      <p:sp>
+        <p:nvSpPr>
+          <p:cNvPr id="33" name="TextBox 32">
+            <a:extLst>
+              <a:ext uri="{FF2B5EF4-FFF2-40B4-BE49-F238E27FC236}">
+                <a16:creationId xmlns:a16="http://schemas.microsoft.com/office/drawing/2014/main" id="{FCF89A87-A38D-3D42-B0E1-33DF2C876B13}"/>
+              </a:ext>
+            </a:extLst>
+          </p:cNvPr>
+          <p:cNvSpPr txBox="1"/>
+          <p:nvPr/>
+        </p:nvSpPr>
+        <p:spPr>
+          <a:xfrm>
+            <a:off x="7239000" y="638702"/>
+            <a:ext cx="1383712" cy="400110"/>
+          </a:xfrm>
+          <a:prstGeom prst="rect">
+            <a:avLst/>
+          </a:prstGeom>
+          <a:noFill/>
+        </p:spPr>
+        <p:txBody>
+          <a:bodyPr wrap="none" rtlCol="0">
+            <a:spAutoFit/>
+          </a:bodyPr>
+          <a:lstStyle/>
+          <a:p>
+            <a:r>
+              <a:rPr lang="en-US" sz="2000" dirty="0">
+                <a:solidFill>
+                  <a:srgbClr val="C00000"/>
+                </a:solidFill>
+              </a:rPr>
+              <a:t>Simulation</a:t>
+            </a:r>
+          </a:p>
+        </p:txBody>
+      </p:sp>
+      <p:sp>
+        <p:nvSpPr>
+          <p:cNvPr id="34" name="TextBox 33">
+            <a:extLst>
+              <a:ext uri="{FF2B5EF4-FFF2-40B4-BE49-F238E27FC236}">
+                <a16:creationId xmlns:a16="http://schemas.microsoft.com/office/drawing/2014/main" id="{A1B131B1-94F8-8544-BA78-307FFF51E374}"/>
+              </a:ext>
+            </a:extLst>
+          </p:cNvPr>
+          <p:cNvSpPr txBox="1"/>
+          <p:nvPr/>
+        </p:nvSpPr>
+        <p:spPr>
+          <a:xfrm>
+            <a:off x="7317547" y="4239910"/>
+            <a:ext cx="1226618" cy="400110"/>
+          </a:xfrm>
+          <a:prstGeom prst="rect">
+            <a:avLst/>
+          </a:prstGeom>
+          <a:noFill/>
+        </p:spPr>
+        <p:txBody>
+          <a:bodyPr wrap="none" rtlCol="0">
+            <a:spAutoFit/>
+          </a:bodyPr>
+          <a:lstStyle/>
+          <a:p>
+            <a:r>
+              <a:rPr lang="en-US" sz="2000" dirty="0">
+                <a:solidFill>
+                  <a:schemeClr val="accent5"/>
+                </a:solidFill>
+              </a:rPr>
+              <a:t>Modeling</a:t>
+            </a:r>
+          </a:p>
+        </p:txBody>
+      </p:sp>
+      <p:cxnSp>
+        <p:nvCxnSpPr>
+          <p:cNvPr id="36" name="Straight Arrow Connector 35">
+            <a:extLst>
+              <a:ext uri="{FF2B5EF4-FFF2-40B4-BE49-F238E27FC236}">
+                <a16:creationId xmlns:a16="http://schemas.microsoft.com/office/drawing/2014/main" id="{A1A6F2A6-4BEB-0A4F-ABDE-D91D22D6E31C}"/>
+              </a:ext>
+            </a:extLst>
+          </p:cNvPr>
+          <p:cNvCxnSpPr/>
+          <p:nvPr/>
+        </p:nvCxnSpPr>
+        <p:spPr>
+          <a:xfrm>
+            <a:off x="7696200" y="1097476"/>
+            <a:ext cx="0" cy="3074474"/>
+          </a:xfrm>
+          <a:prstGeom prst="straightConnector1">
+            <a:avLst/>
+          </a:prstGeom>
+          <a:ln w="38100">
+            <a:solidFill>
+              <a:srgbClr val="C00000"/>
+            </a:solidFill>
+            <a:tailEnd type="triangle"/>
+          </a:ln>
+        </p:spPr>
+        <p:style>
+          <a:lnRef idx="2">
+            <a:schemeClr val="accent1"/>
+          </a:lnRef>
+          <a:fillRef idx="0">
+            <a:schemeClr val="accent1"/>
+          </a:fillRef>
+          <a:effectRef idx="1">
+            <a:schemeClr val="accent1"/>
+          </a:effectRef>
+          <a:fontRef idx="minor">
+            <a:schemeClr val="tx1"/>
+          </a:fontRef>
+        </p:style>
+      </p:cxnSp>
+      <p:cxnSp>
+        <p:nvCxnSpPr>
+          <p:cNvPr id="37" name="Straight Arrow Connector 36">
+            <a:extLst>
+              <a:ext uri="{FF2B5EF4-FFF2-40B4-BE49-F238E27FC236}">
+                <a16:creationId xmlns:a16="http://schemas.microsoft.com/office/drawing/2014/main" id="{46E3EB18-5D41-EB42-89AE-5E052F2DE4CB}"/>
+              </a:ext>
+            </a:extLst>
+          </p:cNvPr>
+          <p:cNvCxnSpPr>
+            <a:cxnSpLocks/>
+          </p:cNvCxnSpPr>
+          <p:nvPr/>
+        </p:nvCxnSpPr>
+        <p:spPr>
+          <a:xfrm flipV="1">
+            <a:off x="8077200" y="1045906"/>
+            <a:ext cx="0" cy="3074474"/>
+          </a:xfrm>
+          <a:prstGeom prst="straightConnector1">
+            <a:avLst/>
+          </a:prstGeom>
+          <a:ln w="38100">
+            <a:solidFill>
+              <a:schemeClr val="accent5"/>
+            </a:solidFill>
+            <a:tailEnd type="triangle"/>
+          </a:ln>
+        </p:spPr>
+        <p:style>
+          <a:lnRef idx="2">
+            <a:schemeClr val="accent1"/>
+          </a:lnRef>
+          <a:fillRef idx="0">
+            <a:schemeClr val="accent1"/>
+          </a:fillRef>
+          <a:effectRef idx="1">
+            <a:schemeClr val="accent1"/>
+          </a:effectRef>
+          <a:fontRef idx="minor">
+            <a:schemeClr val="tx1"/>
+          </a:fontRef>
+        </p:style>
+      </p:cxnSp>
+    </p:spTree>
+    <p:extLst>
+      <p:ext uri="{BB962C8B-B14F-4D97-AF65-F5344CB8AC3E}">
+        <p14:creationId xmlns:p14="http://schemas.microsoft.com/office/powerpoint/2010/main" val="2542058410"/>
+      </p:ext>
+    </p:extLst>
+  </p:cSld>
+  <p:clrMapOvr>
+    <a:masterClrMapping/>
+  </p:clrMapOvr>
+</p:sld>
+</file>
+
+<file path=ppt/slides/slide11.xml><?xml version="1.0" encoding="utf-8"?>
+<p:sld xmlns:a="http://schemas.openxmlformats.org/drawingml/2006/main" xmlns:r="http://schemas.openxmlformats.org/officeDocument/2006/relationships" xmlns:p="http://schemas.openxmlformats.org/presentationml/2006/main">
+  <p:cSld>
+    <p:spTree>
+      <p:nvGrpSpPr>
+        <p:cNvPr id="1" name=""/>
+        <p:cNvGrpSpPr/>
+        <p:nvPr/>
+      </p:nvGrpSpPr>
+      <p:grpSpPr>
+        <a:xfrm>
+          <a:off x="0" y="0"/>
+          <a:ext cx="0" cy="0"/>
+          <a:chOff x="0" y="0"/>
+          <a:chExt cx="0" cy="0"/>
+        </a:xfrm>
+      </p:grpSpPr>
+      <p:sp>
+        <p:nvSpPr>
           <p:cNvPr id="2" name="Title 9">
             <a:extLst>
               <a:ext uri="{FF2B5EF4-FFF2-40B4-BE49-F238E27FC236}">
@@ -6425,8 +7020,8 @@
           </a:p>
         </p:txBody>
       </p:sp>
-      <mc:AlternateContent xmlns:mc="http://schemas.openxmlformats.org/markup-compatibility/2006">
-        <mc:Choice xmlns:a14="http://schemas.microsoft.com/office/drawing/2010/main" Requires="a14">
+      <mc:AlternateContent xmlns:mc="http://schemas.openxmlformats.org/markup-compatibility/2006" xmlns:a14="http://schemas.microsoft.com/office/drawing/2010/main">
+        <mc:Choice Requires="a14">
           <p:sp>
             <p:nvSpPr>
               <p:cNvPr id="3" name="TextBox 2">
@@ -6455,6 +7050,7 @@
               </a:bodyPr>
               <a:lstStyle/>
               <a:p>
+                <a:pPr/>
                 <a14:m>
                   <m:oMathPara xmlns:m="http://schemas.openxmlformats.org/officeDocument/2006/math">
                     <m:oMathParaPr>
@@ -6596,7 +7192,7 @@
             </p:txBody>
           </p:sp>
         </mc:Choice>
-        <mc:Fallback>
+        <mc:Fallback xmlns="">
           <p:sp>
             <p:nvSpPr>
               <p:cNvPr id="3" name="TextBox 2">
@@ -6641,8 +7237,8 @@
           </p:sp>
         </mc:Fallback>
       </mc:AlternateContent>
-      <mc:AlternateContent xmlns:mc="http://schemas.openxmlformats.org/markup-compatibility/2006">
-        <mc:Choice xmlns:a14="http://schemas.microsoft.com/office/drawing/2010/main" Requires="a14">
+      <mc:AlternateContent xmlns:mc="http://schemas.openxmlformats.org/markup-compatibility/2006" xmlns:a14="http://schemas.microsoft.com/office/drawing/2010/main">
+        <mc:Choice Requires="a14">
           <p:sp>
             <p:nvSpPr>
               <p:cNvPr id="15" name="TextBox 14">
@@ -6671,6 +7267,7 @@
               </a:bodyPr>
               <a:lstStyle/>
               <a:p>
+                <a:pPr/>
                 <a14:m>
                   <m:oMathPara xmlns:m="http://schemas.openxmlformats.org/officeDocument/2006/math">
                     <m:oMathParaPr>
@@ -7109,7 +7706,7 @@
             </p:txBody>
           </p:sp>
         </mc:Choice>
-        <mc:Fallback>
+        <mc:Fallback xmlns="">
           <p:sp>
             <p:nvSpPr>
               <p:cNvPr id="15" name="TextBox 14">
@@ -7154,8 +7751,8 @@
           </p:sp>
         </mc:Fallback>
       </mc:AlternateContent>
-      <mc:AlternateContent xmlns:mc="http://schemas.openxmlformats.org/markup-compatibility/2006">
-        <mc:Choice xmlns:a14="http://schemas.microsoft.com/office/drawing/2010/main" Requires="a14">
+      <mc:AlternateContent xmlns:mc="http://schemas.openxmlformats.org/markup-compatibility/2006" xmlns:a14="http://schemas.microsoft.com/office/drawing/2010/main">
+        <mc:Choice Requires="a14">
           <p:sp>
             <p:nvSpPr>
               <p:cNvPr id="18" name="TextBox 17">
@@ -7184,6 +7781,7 @@
               </a:bodyPr>
               <a:lstStyle/>
               <a:p>
+                <a:pPr/>
                 <a14:m>
                   <m:oMathPara xmlns:m="http://schemas.openxmlformats.org/officeDocument/2006/math">
                     <m:oMathParaPr>
@@ -7328,7 +7926,7 @@
             </p:txBody>
           </p:sp>
         </mc:Choice>
-        <mc:Fallback>
+        <mc:Fallback xmlns="">
           <p:sp>
             <p:nvSpPr>
               <p:cNvPr id="18" name="TextBox 17">
@@ -7386,7 +7984,7 @@
 </p:sld>
 </file>
 
-<file path=ppt/slides/slide11.xml><?xml version="1.0" encoding="utf-8"?>
+<file path=ppt/slides/slide12.xml><?xml version="1.0" encoding="utf-8"?>
 <p:sld xmlns:a="http://schemas.openxmlformats.org/drawingml/2006/main" xmlns:r="http://schemas.openxmlformats.org/officeDocument/2006/relationships" xmlns:p="http://schemas.openxmlformats.org/presentationml/2006/main">
   <p:cSld>
     <p:spTree>
@@ -7619,7 +8217,7 @@
 </p:sld>
 </file>
 
-<file path=ppt/slides/slide12.xml><?xml version="1.0" encoding="utf-8"?>
+<file path=ppt/slides/slide13.xml><?xml version="1.0" encoding="utf-8"?>
 <p:sld xmlns:a="http://schemas.openxmlformats.org/drawingml/2006/main" xmlns:r="http://schemas.openxmlformats.org/officeDocument/2006/relationships" xmlns:p="http://schemas.openxmlformats.org/presentationml/2006/main">
   <p:cSld>
     <p:spTree>
@@ -8819,6 +9417,87 @@
       </p:grpSpPr>
       <p:sp>
         <p:nvSpPr>
+          <p:cNvPr id="4" name="TextBox 3">
+            <a:extLst>
+              <a:ext uri="{FF2B5EF4-FFF2-40B4-BE49-F238E27FC236}">
+                <a16:creationId xmlns:a16="http://schemas.microsoft.com/office/drawing/2014/main" id="{2B3DD7A6-AF03-FB4B-A5F1-5E68D73B4671}"/>
+              </a:ext>
+            </a:extLst>
+          </p:cNvPr>
+          <p:cNvSpPr txBox="1"/>
+          <p:nvPr/>
+        </p:nvSpPr>
+        <p:spPr>
+          <a:xfrm>
+            <a:off x="319874" y="2340917"/>
+            <a:ext cx="8504251" cy="461665"/>
+          </a:xfrm>
+          <a:prstGeom prst="rect">
+            <a:avLst/>
+          </a:prstGeom>
+          <a:noFill/>
+        </p:spPr>
+        <p:txBody>
+          <a:bodyPr wrap="none" rtlCol="0">
+            <a:spAutoFit/>
+          </a:bodyPr>
+          <a:lstStyle/>
+          <a:p>
+            <a:r>
+              <a:rPr lang="en-US" dirty="0"/>
+              <a:t>https://</a:t>
+            </a:r>
+            <a:r>
+              <a:rPr lang="en-US" dirty="0" err="1"/>
+              <a:t>github.com</a:t>
+            </a:r>
+            <a:r>
+              <a:rPr lang="en-US" dirty="0"/>
+              <a:t>/marcel-</a:t>
+            </a:r>
+            <a:r>
+              <a:rPr lang="en-US" dirty="0" err="1"/>
+              <a:t>goldschen</a:t>
+            </a:r>
+            <a:r>
+              <a:rPr lang="en-US" dirty="0"/>
+              <a:t>-ohm/INSBootcamp2020</a:t>
+            </a:r>
+          </a:p>
+        </p:txBody>
+      </p:sp>
+    </p:spTree>
+    <p:extLst>
+      <p:ext uri="{BB962C8B-B14F-4D97-AF65-F5344CB8AC3E}">
+        <p14:creationId xmlns:p14="http://schemas.microsoft.com/office/powerpoint/2010/main" val="2720779314"/>
+      </p:ext>
+    </p:extLst>
+  </p:cSld>
+  <p:clrMapOvr>
+    <a:masterClrMapping/>
+  </p:clrMapOvr>
+</p:sld>
+</file>
+
+<file path=ppt/slides/slide3.xml><?xml version="1.0" encoding="utf-8"?>
+<p:sld xmlns:a="http://schemas.openxmlformats.org/drawingml/2006/main" xmlns:r="http://schemas.openxmlformats.org/officeDocument/2006/relationships" xmlns:p="http://schemas.openxmlformats.org/presentationml/2006/main">
+  <p:cSld>
+    <p:spTree>
+      <p:nvGrpSpPr>
+        <p:cNvPr id="1" name=""/>
+        <p:cNvGrpSpPr/>
+        <p:nvPr/>
+      </p:nvGrpSpPr>
+      <p:grpSpPr>
+        <a:xfrm>
+          <a:off x="0" y="0"/>
+          <a:ext cx="0" cy="0"/>
+          <a:chOff x="0" y="0"/>
+          <a:chExt cx="0" cy="0"/>
+        </a:xfrm>
+      </p:grpSpPr>
+      <p:sp>
+        <p:nvSpPr>
           <p:cNvPr id="2" name="TextBox 1">
             <a:extLst>
               <a:ext uri="{FF2B5EF4-FFF2-40B4-BE49-F238E27FC236}">
@@ -9045,7 +9724,7 @@
 </p:sld>
 </file>
 
-<file path=ppt/slides/slide3.xml><?xml version="1.0" encoding="utf-8"?>
+<file path=ppt/slides/slide4.xml><?xml version="1.0" encoding="utf-8"?>
 <p:sld xmlns:a="http://schemas.openxmlformats.org/drawingml/2006/main" xmlns:r="http://schemas.openxmlformats.org/officeDocument/2006/relationships" xmlns:p="http://schemas.openxmlformats.org/presentationml/2006/main">
   <p:cSld>
     <p:spTree>
@@ -9623,7 +10302,7 @@
 </p:sld>
 </file>
 
-<file path=ppt/slides/slide4.xml><?xml version="1.0" encoding="utf-8"?>
+<file path=ppt/slides/slide5.xml><?xml version="1.0" encoding="utf-8"?>
 <p:sld xmlns:a="http://schemas.openxmlformats.org/drawingml/2006/main" xmlns:r="http://schemas.openxmlformats.org/officeDocument/2006/relationships" xmlns:p="http://schemas.openxmlformats.org/presentationml/2006/main">
   <p:cSld>
     <p:spTree>
@@ -10187,7 +10866,7 @@
 </p:sld>
 </file>
 
-<file path=ppt/slides/slide5.xml><?xml version="1.0" encoding="utf-8"?>
+<file path=ppt/slides/slide6.xml><?xml version="1.0" encoding="utf-8"?>
 <p:sld xmlns:a="http://schemas.openxmlformats.org/drawingml/2006/main" xmlns:r="http://schemas.openxmlformats.org/officeDocument/2006/relationships" xmlns:p="http://schemas.openxmlformats.org/presentationml/2006/main">
   <p:cSld>
     <p:spTree>
@@ -10802,7 +11481,7 @@
 </p:sld>
 </file>
 
-<file path=ppt/slides/slide6.xml><?xml version="1.0" encoding="utf-8"?>
+<file path=ppt/slides/slide7.xml><?xml version="1.0" encoding="utf-8"?>
 <p:sld xmlns:a="http://schemas.openxmlformats.org/drawingml/2006/main" xmlns:r="http://schemas.openxmlformats.org/officeDocument/2006/relationships" xmlns:p="http://schemas.openxmlformats.org/presentationml/2006/main">
   <p:cSld>
     <p:spTree>
@@ -11992,7 +12671,7 @@
 </p:sld>
 </file>
 
-<file path=ppt/slides/slide7.xml><?xml version="1.0" encoding="utf-8"?>
+<file path=ppt/slides/slide8.xml><?xml version="1.0" encoding="utf-8"?>
 <p:sld xmlns:a="http://schemas.openxmlformats.org/drawingml/2006/main" xmlns:r="http://schemas.openxmlformats.org/officeDocument/2006/relationships" xmlns:p="http://schemas.openxmlformats.org/presentationml/2006/main">
   <p:cSld>
     <p:spTree>
@@ -15497,7 +16176,7 @@
 </p:sld>
 </file>
 
-<file path=ppt/slides/slide8.xml><?xml version="1.0" encoding="utf-8"?>
+<file path=ppt/slides/slide9.xml><?xml version="1.0" encoding="utf-8"?>
 <p:sld xmlns:a="http://schemas.openxmlformats.org/drawingml/2006/main" xmlns:r="http://schemas.openxmlformats.org/officeDocument/2006/relationships" xmlns:p="http://schemas.openxmlformats.org/presentationml/2006/main">
   <p:cSld>
     <p:spTree>
@@ -15589,509 +16268,6 @@
     <p:extLst>
       <p:ext uri="{BB962C8B-B14F-4D97-AF65-F5344CB8AC3E}">
         <p14:creationId xmlns:p14="http://schemas.microsoft.com/office/powerpoint/2010/main" val="3845185806"/>
-      </p:ext>
-    </p:extLst>
-  </p:cSld>
-  <p:clrMapOvr>
-    <a:masterClrMapping/>
-  </p:clrMapOvr>
-</p:sld>
-</file>
-
-<file path=ppt/slides/slide9.xml><?xml version="1.0" encoding="utf-8"?>
-<p:sld xmlns:a="http://schemas.openxmlformats.org/drawingml/2006/main" xmlns:r="http://schemas.openxmlformats.org/officeDocument/2006/relationships" xmlns:p="http://schemas.openxmlformats.org/presentationml/2006/main">
-  <p:cSld>
-    <p:spTree>
-      <p:nvGrpSpPr>
-        <p:cNvPr id="1" name=""/>
-        <p:cNvGrpSpPr/>
-        <p:nvPr/>
-      </p:nvGrpSpPr>
-      <p:grpSpPr>
-        <a:xfrm>
-          <a:off x="0" y="0"/>
-          <a:ext cx="0" cy="0"/>
-          <a:chOff x="0" y="0"/>
-          <a:chExt cx="0" cy="0"/>
-        </a:xfrm>
-      </p:grpSpPr>
-      <p:sp>
-        <p:nvSpPr>
-          <p:cNvPr id="4" name="TextBox 3">
-            <a:extLst>
-              <a:ext uri="{FF2B5EF4-FFF2-40B4-BE49-F238E27FC236}">
-                <a16:creationId xmlns:a16="http://schemas.microsoft.com/office/drawing/2014/main" id="{683665B9-C7E1-F545-AEFF-6DB85B18262D}"/>
-              </a:ext>
-            </a:extLst>
-          </p:cNvPr>
-          <p:cNvSpPr txBox="1"/>
-          <p:nvPr/>
-        </p:nvSpPr>
-        <p:spPr>
-          <a:xfrm>
-            <a:off x="542608" y="2431792"/>
-            <a:ext cx="6452407" cy="461665"/>
-          </a:xfrm>
-          <a:prstGeom prst="rect">
-            <a:avLst/>
-          </a:prstGeom>
-          <a:noFill/>
-        </p:spPr>
-        <p:txBody>
-          <a:bodyPr wrap="none" rtlCol="0">
-            <a:spAutoFit/>
-          </a:bodyPr>
-          <a:lstStyle/>
-          <a:p>
-            <a:r>
-              <a:rPr lang="en-US" dirty="0">
-                <a:latin typeface="Courier" pitchFamily="2" charset="0"/>
-              </a:rPr>
-              <a:t>COOCODDDCO</a:t>
-            </a:r>
-            <a:r>
-              <a:rPr lang="en-US" dirty="0">
-                <a:solidFill>
-                  <a:srgbClr val="FF0000"/>
-                </a:solidFill>
-                <a:latin typeface="Courier" pitchFamily="2" charset="0"/>
-              </a:rPr>
-              <a:t>O</a:t>
-            </a:r>
-            <a:r>
-              <a:rPr lang="en-US" dirty="0">
-                <a:latin typeface="Courier" pitchFamily="2" charset="0"/>
-              </a:rPr>
-              <a:t>CCDDDDDDCCODDDCOOOCODD…</a:t>
-            </a:r>
-          </a:p>
-        </p:txBody>
-      </p:sp>
-      <p:sp>
-        <p:nvSpPr>
-          <p:cNvPr id="17" name="TextBox 16">
-            <a:extLst>
-              <a:ext uri="{FF2B5EF4-FFF2-40B4-BE49-F238E27FC236}">
-                <a16:creationId xmlns:a16="http://schemas.microsoft.com/office/drawing/2014/main" id="{8FDA5595-1CFA-C34B-AB35-5CD582475B29}"/>
-              </a:ext>
-            </a:extLst>
-          </p:cNvPr>
-          <p:cNvSpPr txBox="1"/>
-          <p:nvPr/>
-        </p:nvSpPr>
-        <p:spPr>
-          <a:xfrm>
-            <a:off x="542608" y="4239910"/>
-            <a:ext cx="6452407" cy="461665"/>
-          </a:xfrm>
-          <a:prstGeom prst="rect">
-            <a:avLst/>
-          </a:prstGeom>
-          <a:noFill/>
-        </p:spPr>
-        <p:txBody>
-          <a:bodyPr wrap="none" rtlCol="0">
-            <a:spAutoFit/>
-          </a:bodyPr>
-          <a:lstStyle/>
-          <a:p>
-            <a:r>
-              <a:rPr lang="en-US" dirty="0">
-                <a:latin typeface="Courier" pitchFamily="2" charset="0"/>
-              </a:rPr>
-              <a:t>0541610015</a:t>
-            </a:r>
-            <a:r>
-              <a:rPr lang="en-US" dirty="0">
-                <a:solidFill>
-                  <a:srgbClr val="FF0000"/>
-                </a:solidFill>
-                <a:latin typeface="Courier" pitchFamily="2" charset="0"/>
-              </a:rPr>
-              <a:t>6</a:t>
-            </a:r>
-            <a:r>
-              <a:rPr lang="en-US" dirty="0">
-                <a:latin typeface="Courier" pitchFamily="2" charset="0"/>
-              </a:rPr>
-              <a:t>0001100100301014450610…</a:t>
-            </a:r>
-          </a:p>
-        </p:txBody>
-      </p:sp>
-      <p:sp>
-        <p:nvSpPr>
-          <p:cNvPr id="5" name="TextBox 4">
-            <a:extLst>
-              <a:ext uri="{FF2B5EF4-FFF2-40B4-BE49-F238E27FC236}">
-                <a16:creationId xmlns:a16="http://schemas.microsoft.com/office/drawing/2014/main" id="{B741060C-5DED-1D4E-A8CE-BA86143A3FE6}"/>
-              </a:ext>
-            </a:extLst>
-          </p:cNvPr>
-          <p:cNvSpPr txBox="1"/>
-          <p:nvPr/>
-        </p:nvSpPr>
-        <p:spPr>
-          <a:xfrm>
-            <a:off x="2769179" y="3848700"/>
-            <a:ext cx="1999265" cy="461665"/>
-          </a:xfrm>
-          <a:prstGeom prst="rect">
-            <a:avLst/>
-          </a:prstGeom>
-          <a:noFill/>
-        </p:spPr>
-        <p:txBody>
-          <a:bodyPr wrap="none" rtlCol="0">
-            <a:spAutoFit/>
-          </a:bodyPr>
-          <a:lstStyle/>
-          <a:p>
-            <a:r>
-              <a:rPr lang="en-US" dirty="0">
-                <a:solidFill>
-                  <a:schemeClr val="accent1"/>
-                </a:solidFill>
-              </a:rPr>
-              <a:t>Observations</a:t>
-            </a:r>
-          </a:p>
-        </p:txBody>
-      </p:sp>
-      <p:sp>
-        <p:nvSpPr>
-          <p:cNvPr id="24" name="TextBox 23">
-            <a:extLst>
-              <a:ext uri="{FF2B5EF4-FFF2-40B4-BE49-F238E27FC236}">
-                <a16:creationId xmlns:a16="http://schemas.microsoft.com/office/drawing/2014/main" id="{D48F3805-6A82-964C-B7FA-47BA54A27E9C}"/>
-              </a:ext>
-            </a:extLst>
-          </p:cNvPr>
-          <p:cNvSpPr txBox="1"/>
-          <p:nvPr/>
-        </p:nvSpPr>
-        <p:spPr>
-          <a:xfrm>
-            <a:off x="2709066" y="2039763"/>
-            <a:ext cx="2119491" cy="461665"/>
-          </a:xfrm>
-          <a:prstGeom prst="rect">
-            <a:avLst/>
-          </a:prstGeom>
-          <a:noFill/>
-        </p:spPr>
-        <p:txBody>
-          <a:bodyPr wrap="none" rtlCol="0">
-            <a:spAutoFit/>
-          </a:bodyPr>
-          <a:lstStyle/>
-          <a:p>
-            <a:r>
-              <a:rPr lang="en-US" dirty="0">
-                <a:solidFill>
-                  <a:schemeClr val="accent1"/>
-                </a:solidFill>
-              </a:rPr>
-              <a:t>Hidden States</a:t>
-            </a:r>
-          </a:p>
-        </p:txBody>
-      </p:sp>
-      <p:sp>
-        <p:nvSpPr>
-          <p:cNvPr id="30" name="TextBox 29">
-            <a:extLst>
-              <a:ext uri="{FF2B5EF4-FFF2-40B4-BE49-F238E27FC236}">
-                <a16:creationId xmlns:a16="http://schemas.microsoft.com/office/drawing/2014/main" id="{1E908FEB-FC72-3E4A-B13F-E7DFB17E81C2}"/>
-              </a:ext>
-            </a:extLst>
-          </p:cNvPr>
-          <p:cNvSpPr txBox="1"/>
-          <p:nvPr/>
-        </p:nvSpPr>
-        <p:spPr>
-          <a:xfrm>
-            <a:off x="3308589" y="607925"/>
-            <a:ext cx="920445" cy="461665"/>
-          </a:xfrm>
-          <a:prstGeom prst="rect">
-            <a:avLst/>
-          </a:prstGeom>
-          <a:noFill/>
-        </p:spPr>
-        <p:txBody>
-          <a:bodyPr wrap="none" rtlCol="0">
-            <a:spAutoFit/>
-          </a:bodyPr>
-          <a:lstStyle/>
-          <a:p>
-            <a:r>
-              <a:rPr lang="en-US" dirty="0">
-                <a:solidFill>
-                  <a:schemeClr val="accent1"/>
-                </a:solidFill>
-              </a:rPr>
-              <a:t>HMM</a:t>
-            </a:r>
-          </a:p>
-        </p:txBody>
-      </p:sp>
-      <p:sp>
-        <p:nvSpPr>
-          <p:cNvPr id="31" name="Up-Down Arrow 30">
-            <a:extLst>
-              <a:ext uri="{FF2B5EF4-FFF2-40B4-BE49-F238E27FC236}">
-                <a16:creationId xmlns:a16="http://schemas.microsoft.com/office/drawing/2014/main" id="{4FE57355-1CA8-1743-B349-BC659B253737}"/>
-              </a:ext>
-            </a:extLst>
-          </p:cNvPr>
-          <p:cNvSpPr/>
-          <p:nvPr/>
-        </p:nvSpPr>
-        <p:spPr>
-          <a:xfrm>
-            <a:off x="3581400" y="1097476"/>
-            <a:ext cx="381000" cy="914400"/>
-          </a:xfrm>
-          <a:prstGeom prst="upDownArrow">
-            <a:avLst/>
-          </a:prstGeom>
-        </p:spPr>
-        <p:style>
-          <a:lnRef idx="1">
-            <a:schemeClr val="accent1"/>
-          </a:lnRef>
-          <a:fillRef idx="3">
-            <a:schemeClr val="accent1"/>
-          </a:fillRef>
-          <a:effectRef idx="2">
-            <a:schemeClr val="accent1"/>
-          </a:effectRef>
-          <a:fontRef idx="minor">
-            <a:schemeClr val="lt1"/>
-          </a:fontRef>
-        </p:style>
-        <p:txBody>
-          <a:bodyPr rtlCol="0" anchor="ctr"/>
-          <a:lstStyle/>
-          <a:p>
-            <a:pPr algn="ctr"/>
-            <a:endParaRPr lang="en-US"/>
-          </a:p>
-        </p:txBody>
-      </p:sp>
-      <p:sp>
-        <p:nvSpPr>
-          <p:cNvPr id="32" name="Up-Down Arrow 31">
-            <a:extLst>
-              <a:ext uri="{FF2B5EF4-FFF2-40B4-BE49-F238E27FC236}">
-                <a16:creationId xmlns:a16="http://schemas.microsoft.com/office/drawing/2014/main" id="{B4817856-AEA2-B24A-ADF3-5D6C1E7D04B5}"/>
-              </a:ext>
-            </a:extLst>
-          </p:cNvPr>
-          <p:cNvSpPr/>
-          <p:nvPr/>
-        </p:nvSpPr>
-        <p:spPr>
-          <a:xfrm>
-            <a:off x="3578311" y="2913878"/>
-            <a:ext cx="381000" cy="914400"/>
-          </a:xfrm>
-          <a:prstGeom prst="upDownArrow">
-            <a:avLst/>
-          </a:prstGeom>
-        </p:spPr>
-        <p:style>
-          <a:lnRef idx="1">
-            <a:schemeClr val="accent1"/>
-          </a:lnRef>
-          <a:fillRef idx="3">
-            <a:schemeClr val="accent1"/>
-          </a:fillRef>
-          <a:effectRef idx="2">
-            <a:schemeClr val="accent1"/>
-          </a:effectRef>
-          <a:fontRef idx="minor">
-            <a:schemeClr val="lt1"/>
-          </a:fontRef>
-        </p:style>
-        <p:txBody>
-          <a:bodyPr rtlCol="0" anchor="ctr"/>
-          <a:lstStyle/>
-          <a:p>
-            <a:pPr algn="ctr"/>
-            <a:endParaRPr lang="en-US"/>
-          </a:p>
-        </p:txBody>
-      </p:sp>
-      <p:sp>
-        <p:nvSpPr>
-          <p:cNvPr id="33" name="TextBox 32">
-            <a:extLst>
-              <a:ext uri="{FF2B5EF4-FFF2-40B4-BE49-F238E27FC236}">
-                <a16:creationId xmlns:a16="http://schemas.microsoft.com/office/drawing/2014/main" id="{FCF89A87-A38D-3D42-B0E1-33DF2C876B13}"/>
-              </a:ext>
-            </a:extLst>
-          </p:cNvPr>
-          <p:cNvSpPr txBox="1"/>
-          <p:nvPr/>
-        </p:nvSpPr>
-        <p:spPr>
-          <a:xfrm>
-            <a:off x="7239000" y="638702"/>
-            <a:ext cx="1383712" cy="400110"/>
-          </a:xfrm>
-          <a:prstGeom prst="rect">
-            <a:avLst/>
-          </a:prstGeom>
-          <a:noFill/>
-        </p:spPr>
-        <p:txBody>
-          <a:bodyPr wrap="none" rtlCol="0">
-            <a:spAutoFit/>
-          </a:bodyPr>
-          <a:lstStyle/>
-          <a:p>
-            <a:r>
-              <a:rPr lang="en-US" sz="2000" dirty="0">
-                <a:solidFill>
-                  <a:srgbClr val="C00000"/>
-                </a:solidFill>
-              </a:rPr>
-              <a:t>Simulation</a:t>
-            </a:r>
-          </a:p>
-        </p:txBody>
-      </p:sp>
-      <p:sp>
-        <p:nvSpPr>
-          <p:cNvPr id="34" name="TextBox 33">
-            <a:extLst>
-              <a:ext uri="{FF2B5EF4-FFF2-40B4-BE49-F238E27FC236}">
-                <a16:creationId xmlns:a16="http://schemas.microsoft.com/office/drawing/2014/main" id="{A1B131B1-94F8-8544-BA78-307FFF51E374}"/>
-              </a:ext>
-            </a:extLst>
-          </p:cNvPr>
-          <p:cNvSpPr txBox="1"/>
-          <p:nvPr/>
-        </p:nvSpPr>
-        <p:spPr>
-          <a:xfrm>
-            <a:off x="7317547" y="4239910"/>
-            <a:ext cx="1226618" cy="400110"/>
-          </a:xfrm>
-          <a:prstGeom prst="rect">
-            <a:avLst/>
-          </a:prstGeom>
-          <a:noFill/>
-        </p:spPr>
-        <p:txBody>
-          <a:bodyPr wrap="none" rtlCol="0">
-            <a:spAutoFit/>
-          </a:bodyPr>
-          <a:lstStyle/>
-          <a:p>
-            <a:r>
-              <a:rPr lang="en-US" sz="2000" dirty="0">
-                <a:solidFill>
-                  <a:schemeClr val="accent5"/>
-                </a:solidFill>
-              </a:rPr>
-              <a:t>Modeling</a:t>
-            </a:r>
-          </a:p>
-        </p:txBody>
-      </p:sp>
-      <p:cxnSp>
-        <p:nvCxnSpPr>
-          <p:cNvPr id="36" name="Straight Arrow Connector 35">
-            <a:extLst>
-              <a:ext uri="{FF2B5EF4-FFF2-40B4-BE49-F238E27FC236}">
-                <a16:creationId xmlns:a16="http://schemas.microsoft.com/office/drawing/2014/main" id="{A1A6F2A6-4BEB-0A4F-ABDE-D91D22D6E31C}"/>
-              </a:ext>
-            </a:extLst>
-          </p:cNvPr>
-          <p:cNvCxnSpPr/>
-          <p:nvPr/>
-        </p:nvCxnSpPr>
-        <p:spPr>
-          <a:xfrm>
-            <a:off x="7696200" y="1097476"/>
-            <a:ext cx="0" cy="3074474"/>
-          </a:xfrm>
-          <a:prstGeom prst="straightConnector1">
-            <a:avLst/>
-          </a:prstGeom>
-          <a:ln w="38100">
-            <a:solidFill>
-              <a:srgbClr val="C00000"/>
-            </a:solidFill>
-            <a:tailEnd type="triangle"/>
-          </a:ln>
-        </p:spPr>
-        <p:style>
-          <a:lnRef idx="2">
-            <a:schemeClr val="accent1"/>
-          </a:lnRef>
-          <a:fillRef idx="0">
-            <a:schemeClr val="accent1"/>
-          </a:fillRef>
-          <a:effectRef idx="1">
-            <a:schemeClr val="accent1"/>
-          </a:effectRef>
-          <a:fontRef idx="minor">
-            <a:schemeClr val="tx1"/>
-          </a:fontRef>
-        </p:style>
-      </p:cxnSp>
-      <p:cxnSp>
-        <p:nvCxnSpPr>
-          <p:cNvPr id="37" name="Straight Arrow Connector 36">
-            <a:extLst>
-              <a:ext uri="{FF2B5EF4-FFF2-40B4-BE49-F238E27FC236}">
-                <a16:creationId xmlns:a16="http://schemas.microsoft.com/office/drawing/2014/main" id="{46E3EB18-5D41-EB42-89AE-5E052F2DE4CB}"/>
-              </a:ext>
-            </a:extLst>
-          </p:cNvPr>
-          <p:cNvCxnSpPr>
-            <a:cxnSpLocks/>
-          </p:cNvCxnSpPr>
-          <p:nvPr/>
-        </p:nvCxnSpPr>
-        <p:spPr>
-          <a:xfrm flipV="1">
-            <a:off x="8077200" y="1045906"/>
-            <a:ext cx="0" cy="3074474"/>
-          </a:xfrm>
-          <a:prstGeom prst="straightConnector1">
-            <a:avLst/>
-          </a:prstGeom>
-          <a:ln w="38100">
-            <a:solidFill>
-              <a:schemeClr val="accent5"/>
-            </a:solidFill>
-            <a:tailEnd type="triangle"/>
-          </a:ln>
-        </p:spPr>
-        <p:style>
-          <a:lnRef idx="2">
-            <a:schemeClr val="accent1"/>
-          </a:lnRef>
-          <a:fillRef idx="0">
-            <a:schemeClr val="accent1"/>
-          </a:fillRef>
-          <a:effectRef idx="1">
-            <a:schemeClr val="accent1"/>
-          </a:effectRef>
-          <a:fontRef idx="minor">
-            <a:schemeClr val="tx1"/>
-          </a:fontRef>
-        </p:style>
-      </p:cxnSp>
-    </p:spTree>
-    <p:extLst>
-      <p:ext uri="{BB962C8B-B14F-4D97-AF65-F5344CB8AC3E}">
-        <p14:creationId xmlns:p14="http://schemas.microsoft.com/office/powerpoint/2010/main" val="2542058410"/>
       </p:ext>
     </p:extLst>
   </p:cSld>

</xml_diff>